<commit_message>
se incluyo a Jairo Fuquen
</commit_message>
<xml_diff>
--- a/imagenes/fotos_conferencistas.pptx
+++ b/imagenes/fotos_conferencistas.pptx
@@ -7,6 +7,7 @@
   <p:sldIdLst>
     <p:sldId id="256" r:id="rId2"/>
     <p:sldId id="257" r:id="rId3"/>
+    <p:sldId id="258" r:id="rId4"/>
   </p:sldIdLst>
   <p:sldSz cx="9144000" cy="6858000" type="screen4x3"/>
   <p:notesSz cx="6858000" cy="9144000"/>
@@ -107,7 +108,7 @@
   </p:defaultTextStyle>
   <p:extLst>
     <p:ext uri="{EFAFB233-063F-42B5-8137-9DF3F51BA10A}">
-      <p15:sldGuideLst xmlns:p15="http://schemas.microsoft.com/office/powerpoint/2012/main">
+      <p15:sldGuideLst xmlns:p15="http://schemas.microsoft.com/office/powerpoint/2012/main" xmlns="">
         <p15:guide id="1" orient="horz" pos="2160">
           <p15:clr>
             <a:srgbClr val="A4A3A4"/>
@@ -305,7 +306,7 @@
           <a:p>
             <a:fld id="{A024B3BE-3465-4E30-B4C9-D82950137A0E}" type="datetimeFigureOut">
               <a:rPr lang="pt-BR" smtClean="0"/>
-              <a:t>17/12/2018</a:t>
+              <a:t>06/02/2019</a:t>
             </a:fld>
             <a:endParaRPr lang="pt-BR"/>
           </a:p>
@@ -347,7 +348,7 @@
           <a:p>
             <a:fld id="{E04F2195-75BF-44EC-BF37-2B2A1FBED77A}" type="slidenum">
               <a:rPr lang="pt-BR" smtClean="0"/>
-              <a:t>‹Nº›</a:t>
+              <a:t>‹nº›</a:t>
             </a:fld>
             <a:endParaRPr lang="pt-BR"/>
           </a:p>
@@ -475,7 +476,7 @@
           <a:p>
             <a:fld id="{A024B3BE-3465-4E30-B4C9-D82950137A0E}" type="datetimeFigureOut">
               <a:rPr lang="pt-BR" smtClean="0"/>
-              <a:t>17/12/2018</a:t>
+              <a:t>06/02/2019</a:t>
             </a:fld>
             <a:endParaRPr lang="pt-BR"/>
           </a:p>
@@ -517,7 +518,7 @@
           <a:p>
             <a:fld id="{E04F2195-75BF-44EC-BF37-2B2A1FBED77A}" type="slidenum">
               <a:rPr lang="pt-BR" smtClean="0"/>
-              <a:t>‹Nº›</a:t>
+              <a:t>‹nº›</a:t>
             </a:fld>
             <a:endParaRPr lang="pt-BR"/>
           </a:p>
@@ -655,7 +656,7 @@
           <a:p>
             <a:fld id="{A024B3BE-3465-4E30-B4C9-D82950137A0E}" type="datetimeFigureOut">
               <a:rPr lang="pt-BR" smtClean="0"/>
-              <a:t>17/12/2018</a:t>
+              <a:t>06/02/2019</a:t>
             </a:fld>
             <a:endParaRPr lang="pt-BR"/>
           </a:p>
@@ -697,7 +698,7 @@
           <a:p>
             <a:fld id="{E04F2195-75BF-44EC-BF37-2B2A1FBED77A}" type="slidenum">
               <a:rPr lang="pt-BR" smtClean="0"/>
-              <a:t>‹Nº›</a:t>
+              <a:t>‹nº›</a:t>
             </a:fld>
             <a:endParaRPr lang="pt-BR"/>
           </a:p>
@@ -825,7 +826,7 @@
           <a:p>
             <a:fld id="{A024B3BE-3465-4E30-B4C9-D82950137A0E}" type="datetimeFigureOut">
               <a:rPr lang="pt-BR" smtClean="0"/>
-              <a:t>17/12/2018</a:t>
+              <a:t>06/02/2019</a:t>
             </a:fld>
             <a:endParaRPr lang="pt-BR"/>
           </a:p>
@@ -867,7 +868,7 @@
           <a:p>
             <a:fld id="{E04F2195-75BF-44EC-BF37-2B2A1FBED77A}" type="slidenum">
               <a:rPr lang="pt-BR" smtClean="0"/>
-              <a:t>‹Nº›</a:t>
+              <a:t>‹nº›</a:t>
             </a:fld>
             <a:endParaRPr lang="pt-BR"/>
           </a:p>
@@ -1071,7 +1072,7 @@
           <a:p>
             <a:fld id="{A024B3BE-3465-4E30-B4C9-D82950137A0E}" type="datetimeFigureOut">
               <a:rPr lang="pt-BR" smtClean="0"/>
-              <a:t>17/12/2018</a:t>
+              <a:t>06/02/2019</a:t>
             </a:fld>
             <a:endParaRPr lang="pt-BR"/>
           </a:p>
@@ -1113,7 +1114,7 @@
           <a:p>
             <a:fld id="{E04F2195-75BF-44EC-BF37-2B2A1FBED77A}" type="slidenum">
               <a:rPr lang="pt-BR" smtClean="0"/>
-              <a:t>‹Nº›</a:t>
+              <a:t>‹nº›</a:t>
             </a:fld>
             <a:endParaRPr lang="pt-BR"/>
           </a:p>
@@ -1359,7 +1360,7 @@
           <a:p>
             <a:fld id="{A024B3BE-3465-4E30-B4C9-D82950137A0E}" type="datetimeFigureOut">
               <a:rPr lang="pt-BR" smtClean="0"/>
-              <a:t>17/12/2018</a:t>
+              <a:t>06/02/2019</a:t>
             </a:fld>
             <a:endParaRPr lang="pt-BR"/>
           </a:p>
@@ -1401,7 +1402,7 @@
           <a:p>
             <a:fld id="{E04F2195-75BF-44EC-BF37-2B2A1FBED77A}" type="slidenum">
               <a:rPr lang="pt-BR" smtClean="0"/>
-              <a:t>‹Nº›</a:t>
+              <a:t>‹nº›</a:t>
             </a:fld>
             <a:endParaRPr lang="pt-BR"/>
           </a:p>
@@ -1781,7 +1782,7 @@
           <a:p>
             <a:fld id="{A024B3BE-3465-4E30-B4C9-D82950137A0E}" type="datetimeFigureOut">
               <a:rPr lang="pt-BR" smtClean="0"/>
-              <a:t>17/12/2018</a:t>
+              <a:t>06/02/2019</a:t>
             </a:fld>
             <a:endParaRPr lang="pt-BR"/>
           </a:p>
@@ -1823,7 +1824,7 @@
           <a:p>
             <a:fld id="{E04F2195-75BF-44EC-BF37-2B2A1FBED77A}" type="slidenum">
               <a:rPr lang="pt-BR" smtClean="0"/>
-              <a:t>‹Nº›</a:t>
+              <a:t>‹nº›</a:t>
             </a:fld>
             <a:endParaRPr lang="pt-BR"/>
           </a:p>
@@ -1899,7 +1900,7 @@
           <a:p>
             <a:fld id="{A024B3BE-3465-4E30-B4C9-D82950137A0E}" type="datetimeFigureOut">
               <a:rPr lang="pt-BR" smtClean="0"/>
-              <a:t>17/12/2018</a:t>
+              <a:t>06/02/2019</a:t>
             </a:fld>
             <a:endParaRPr lang="pt-BR"/>
           </a:p>
@@ -1941,7 +1942,7 @@
           <a:p>
             <a:fld id="{E04F2195-75BF-44EC-BF37-2B2A1FBED77A}" type="slidenum">
               <a:rPr lang="pt-BR" smtClean="0"/>
-              <a:t>‹Nº›</a:t>
+              <a:t>‹nº›</a:t>
             </a:fld>
             <a:endParaRPr lang="pt-BR"/>
           </a:p>
@@ -1994,7 +1995,7 @@
           <a:p>
             <a:fld id="{A024B3BE-3465-4E30-B4C9-D82950137A0E}" type="datetimeFigureOut">
               <a:rPr lang="pt-BR" smtClean="0"/>
-              <a:t>17/12/2018</a:t>
+              <a:t>06/02/2019</a:t>
             </a:fld>
             <a:endParaRPr lang="pt-BR"/>
           </a:p>
@@ -2036,7 +2037,7 @@
           <a:p>
             <a:fld id="{E04F2195-75BF-44EC-BF37-2B2A1FBED77A}" type="slidenum">
               <a:rPr lang="pt-BR" smtClean="0"/>
-              <a:t>‹Nº›</a:t>
+              <a:t>‹nº›</a:t>
             </a:fld>
             <a:endParaRPr lang="pt-BR"/>
           </a:p>
@@ -2271,7 +2272,7 @@
           <a:p>
             <a:fld id="{A024B3BE-3465-4E30-B4C9-D82950137A0E}" type="datetimeFigureOut">
               <a:rPr lang="pt-BR" smtClean="0"/>
-              <a:t>17/12/2018</a:t>
+              <a:t>06/02/2019</a:t>
             </a:fld>
             <a:endParaRPr lang="pt-BR"/>
           </a:p>
@@ -2313,7 +2314,7 @@
           <a:p>
             <a:fld id="{E04F2195-75BF-44EC-BF37-2B2A1FBED77A}" type="slidenum">
               <a:rPr lang="pt-BR" smtClean="0"/>
-              <a:t>‹Nº›</a:t>
+              <a:t>‹nº›</a:t>
             </a:fld>
             <a:endParaRPr lang="pt-BR"/>
           </a:p>
@@ -2524,7 +2525,7 @@
           <a:p>
             <a:fld id="{A024B3BE-3465-4E30-B4C9-D82950137A0E}" type="datetimeFigureOut">
               <a:rPr lang="pt-BR" smtClean="0"/>
-              <a:t>17/12/2018</a:t>
+              <a:t>06/02/2019</a:t>
             </a:fld>
             <a:endParaRPr lang="pt-BR"/>
           </a:p>
@@ -2566,7 +2567,7 @@
           <a:p>
             <a:fld id="{E04F2195-75BF-44EC-BF37-2B2A1FBED77A}" type="slidenum">
               <a:rPr lang="pt-BR" smtClean="0"/>
-              <a:t>‹Nº›</a:t>
+              <a:t>‹nº›</a:t>
             </a:fld>
             <a:endParaRPr lang="pt-BR"/>
           </a:p>
@@ -2737,7 +2738,7 @@
           <a:p>
             <a:fld id="{A024B3BE-3465-4E30-B4C9-D82950137A0E}" type="datetimeFigureOut">
               <a:rPr lang="pt-BR" smtClean="0"/>
-              <a:t>17/12/2018</a:t>
+              <a:t>06/02/2019</a:t>
             </a:fld>
             <a:endParaRPr lang="pt-BR"/>
           </a:p>
@@ -2815,7 +2816,7 @@
           <a:p>
             <a:fld id="{E04F2195-75BF-44EC-BF37-2B2A1FBED77A}" type="slidenum">
               <a:rPr lang="pt-BR" smtClean="0"/>
-              <a:t>‹Nº›</a:t>
+              <a:t>‹nº›</a:t>
             </a:fld>
             <a:endParaRPr lang="pt-BR"/>
           </a:p>
@@ -3237,6 +3238,72 @@
 </p:sld>
 </file>
 
+<file path=ppt/slides/slide3.xml><?xml version="1.0" encoding="utf-8"?>
+<p:sld xmlns:a="http://schemas.openxmlformats.org/drawingml/2006/main" xmlns:r="http://schemas.openxmlformats.org/officeDocument/2006/relationships" xmlns:p="http://schemas.openxmlformats.org/presentationml/2006/main">
+  <p:cSld>
+    <p:spTree>
+      <p:nvGrpSpPr>
+        <p:cNvPr id="1" name=""/>
+        <p:cNvGrpSpPr/>
+        <p:nvPr/>
+      </p:nvGrpSpPr>
+      <p:grpSpPr>
+        <a:xfrm>
+          <a:off x="0" y="0"/>
+          <a:ext cx="0" cy="0"/>
+          <a:chOff x="0" y="0"/>
+          <a:chExt cx="0" cy="0"/>
+        </a:xfrm>
+      </p:grpSpPr>
+      <p:pic>
+        <p:nvPicPr>
+          <p:cNvPr id="2" name="Imagem 1"/>
+          <p:cNvPicPr>
+            <a:picLocks noChangeAspect="1"/>
+          </p:cNvPicPr>
+          <p:nvPr/>
+        </p:nvPicPr>
+        <p:blipFill>
+          <a:blip r:embed="rId2">
+            <a:extLst>
+              <a:ext uri="{28A0092B-C50C-407E-A947-70E740481C1C}">
+                <a14:useLocalDpi xmlns:a14="http://schemas.microsoft.com/office/drawing/2010/main" val="0"/>
+              </a:ext>
+            </a:extLst>
+          </a:blip>
+          <a:stretch>
+            <a:fillRect/>
+          </a:stretch>
+        </p:blipFill>
+        <p:spPr>
+          <a:xfrm rot="2675730">
+            <a:off x="3054430" y="2054064"/>
+            <a:ext cx="3103347" cy="3103347"/>
+          </a:xfrm>
+          <a:prstGeom prst="ellipse">
+            <a:avLst/>
+          </a:prstGeom>
+          <a:ln>
+            <a:noFill/>
+          </a:ln>
+          <a:effectLst>
+            <a:softEdge rad="112500"/>
+          </a:effectLst>
+        </p:spPr>
+      </p:pic>
+    </p:spTree>
+    <p:extLst>
+      <p:ext uri="{BB962C8B-B14F-4D97-AF65-F5344CB8AC3E}">
+        <p14:creationId xmlns:p14="http://schemas.microsoft.com/office/powerpoint/2010/main" val="3187778562"/>
+      </p:ext>
+    </p:extLst>
+  </p:cSld>
+  <p:clrMapOvr>
+    <a:masterClrMapping/>
+  </p:clrMapOvr>
+</p:sld>
+</file>
+
 <file path=ppt/theme/theme1.xml><?xml version="1.0" encoding="utf-8"?>
 <a:theme xmlns:a="http://schemas.openxmlformats.org/drawingml/2006/main" name="Tema do Office">
   <a:themeElements>

</xml_diff>

<commit_message>
se incluyó a velez
</commit_message>
<xml_diff>
--- a/imagenes/fotos_conferencistas.pptx
+++ b/imagenes/fotos_conferencistas.pptx
@@ -8,6 +8,7 @@
     <p:sldId id="256" r:id="rId2"/>
     <p:sldId id="257" r:id="rId3"/>
     <p:sldId id="258" r:id="rId4"/>
+    <p:sldId id="259" r:id="rId5"/>
   </p:sldIdLst>
   <p:sldSz cx="9144000" cy="6858000" type="screen4x3"/>
   <p:notesSz cx="6858000" cy="9144000"/>
@@ -108,7 +109,7 @@
   </p:defaultTextStyle>
   <p:extLst>
     <p:ext uri="{EFAFB233-063F-42B5-8137-9DF3F51BA10A}">
-      <p15:sldGuideLst xmlns:p15="http://schemas.microsoft.com/office/powerpoint/2012/main" xmlns="">
+      <p15:sldGuideLst xmlns:p15="http://schemas.microsoft.com/office/powerpoint/2012/main">
         <p15:guide id="1" orient="horz" pos="2160">
           <p15:clr>
             <a:srgbClr val="A4A3A4"/>
@@ -306,7 +307,7 @@
           <a:p>
             <a:fld id="{A024B3BE-3465-4E30-B4C9-D82950137A0E}" type="datetimeFigureOut">
               <a:rPr lang="pt-BR" smtClean="0"/>
-              <a:t>06/02/2019</a:t>
+              <a:t>07/10/2019</a:t>
             </a:fld>
             <a:endParaRPr lang="pt-BR"/>
           </a:p>
@@ -348,7 +349,7 @@
           <a:p>
             <a:fld id="{E04F2195-75BF-44EC-BF37-2B2A1FBED77A}" type="slidenum">
               <a:rPr lang="pt-BR" smtClean="0"/>
-              <a:t>‹nº›</a:t>
+              <a:t>‹Nº›</a:t>
             </a:fld>
             <a:endParaRPr lang="pt-BR"/>
           </a:p>
@@ -476,7 +477,7 @@
           <a:p>
             <a:fld id="{A024B3BE-3465-4E30-B4C9-D82950137A0E}" type="datetimeFigureOut">
               <a:rPr lang="pt-BR" smtClean="0"/>
-              <a:t>06/02/2019</a:t>
+              <a:t>07/10/2019</a:t>
             </a:fld>
             <a:endParaRPr lang="pt-BR"/>
           </a:p>
@@ -518,7 +519,7 @@
           <a:p>
             <a:fld id="{E04F2195-75BF-44EC-BF37-2B2A1FBED77A}" type="slidenum">
               <a:rPr lang="pt-BR" smtClean="0"/>
-              <a:t>‹nº›</a:t>
+              <a:t>‹Nº›</a:t>
             </a:fld>
             <a:endParaRPr lang="pt-BR"/>
           </a:p>
@@ -656,7 +657,7 @@
           <a:p>
             <a:fld id="{A024B3BE-3465-4E30-B4C9-D82950137A0E}" type="datetimeFigureOut">
               <a:rPr lang="pt-BR" smtClean="0"/>
-              <a:t>06/02/2019</a:t>
+              <a:t>07/10/2019</a:t>
             </a:fld>
             <a:endParaRPr lang="pt-BR"/>
           </a:p>
@@ -698,7 +699,7 @@
           <a:p>
             <a:fld id="{E04F2195-75BF-44EC-BF37-2B2A1FBED77A}" type="slidenum">
               <a:rPr lang="pt-BR" smtClean="0"/>
-              <a:t>‹nº›</a:t>
+              <a:t>‹Nº›</a:t>
             </a:fld>
             <a:endParaRPr lang="pt-BR"/>
           </a:p>
@@ -826,7 +827,7 @@
           <a:p>
             <a:fld id="{A024B3BE-3465-4E30-B4C9-D82950137A0E}" type="datetimeFigureOut">
               <a:rPr lang="pt-BR" smtClean="0"/>
-              <a:t>06/02/2019</a:t>
+              <a:t>07/10/2019</a:t>
             </a:fld>
             <a:endParaRPr lang="pt-BR"/>
           </a:p>
@@ -868,7 +869,7 @@
           <a:p>
             <a:fld id="{E04F2195-75BF-44EC-BF37-2B2A1FBED77A}" type="slidenum">
               <a:rPr lang="pt-BR" smtClean="0"/>
-              <a:t>‹nº›</a:t>
+              <a:t>‹Nº›</a:t>
             </a:fld>
             <a:endParaRPr lang="pt-BR"/>
           </a:p>
@@ -1072,7 +1073,7 @@
           <a:p>
             <a:fld id="{A024B3BE-3465-4E30-B4C9-D82950137A0E}" type="datetimeFigureOut">
               <a:rPr lang="pt-BR" smtClean="0"/>
-              <a:t>06/02/2019</a:t>
+              <a:t>07/10/2019</a:t>
             </a:fld>
             <a:endParaRPr lang="pt-BR"/>
           </a:p>
@@ -1114,7 +1115,7 @@
           <a:p>
             <a:fld id="{E04F2195-75BF-44EC-BF37-2B2A1FBED77A}" type="slidenum">
               <a:rPr lang="pt-BR" smtClean="0"/>
-              <a:t>‹nº›</a:t>
+              <a:t>‹Nº›</a:t>
             </a:fld>
             <a:endParaRPr lang="pt-BR"/>
           </a:p>
@@ -1360,7 +1361,7 @@
           <a:p>
             <a:fld id="{A024B3BE-3465-4E30-B4C9-D82950137A0E}" type="datetimeFigureOut">
               <a:rPr lang="pt-BR" smtClean="0"/>
-              <a:t>06/02/2019</a:t>
+              <a:t>07/10/2019</a:t>
             </a:fld>
             <a:endParaRPr lang="pt-BR"/>
           </a:p>
@@ -1402,7 +1403,7 @@
           <a:p>
             <a:fld id="{E04F2195-75BF-44EC-BF37-2B2A1FBED77A}" type="slidenum">
               <a:rPr lang="pt-BR" smtClean="0"/>
-              <a:t>‹nº›</a:t>
+              <a:t>‹Nº›</a:t>
             </a:fld>
             <a:endParaRPr lang="pt-BR"/>
           </a:p>
@@ -1782,7 +1783,7 @@
           <a:p>
             <a:fld id="{A024B3BE-3465-4E30-B4C9-D82950137A0E}" type="datetimeFigureOut">
               <a:rPr lang="pt-BR" smtClean="0"/>
-              <a:t>06/02/2019</a:t>
+              <a:t>07/10/2019</a:t>
             </a:fld>
             <a:endParaRPr lang="pt-BR"/>
           </a:p>
@@ -1824,7 +1825,7 @@
           <a:p>
             <a:fld id="{E04F2195-75BF-44EC-BF37-2B2A1FBED77A}" type="slidenum">
               <a:rPr lang="pt-BR" smtClean="0"/>
-              <a:t>‹nº›</a:t>
+              <a:t>‹Nº›</a:t>
             </a:fld>
             <a:endParaRPr lang="pt-BR"/>
           </a:p>
@@ -1900,7 +1901,7 @@
           <a:p>
             <a:fld id="{A024B3BE-3465-4E30-B4C9-D82950137A0E}" type="datetimeFigureOut">
               <a:rPr lang="pt-BR" smtClean="0"/>
-              <a:t>06/02/2019</a:t>
+              <a:t>07/10/2019</a:t>
             </a:fld>
             <a:endParaRPr lang="pt-BR"/>
           </a:p>
@@ -1942,7 +1943,7 @@
           <a:p>
             <a:fld id="{E04F2195-75BF-44EC-BF37-2B2A1FBED77A}" type="slidenum">
               <a:rPr lang="pt-BR" smtClean="0"/>
-              <a:t>‹nº›</a:t>
+              <a:t>‹Nº›</a:t>
             </a:fld>
             <a:endParaRPr lang="pt-BR"/>
           </a:p>
@@ -1995,7 +1996,7 @@
           <a:p>
             <a:fld id="{A024B3BE-3465-4E30-B4C9-D82950137A0E}" type="datetimeFigureOut">
               <a:rPr lang="pt-BR" smtClean="0"/>
-              <a:t>06/02/2019</a:t>
+              <a:t>07/10/2019</a:t>
             </a:fld>
             <a:endParaRPr lang="pt-BR"/>
           </a:p>
@@ -2037,7 +2038,7 @@
           <a:p>
             <a:fld id="{E04F2195-75BF-44EC-BF37-2B2A1FBED77A}" type="slidenum">
               <a:rPr lang="pt-BR" smtClean="0"/>
-              <a:t>‹nº›</a:t>
+              <a:t>‹Nº›</a:t>
             </a:fld>
             <a:endParaRPr lang="pt-BR"/>
           </a:p>
@@ -2272,7 +2273,7 @@
           <a:p>
             <a:fld id="{A024B3BE-3465-4E30-B4C9-D82950137A0E}" type="datetimeFigureOut">
               <a:rPr lang="pt-BR" smtClean="0"/>
-              <a:t>06/02/2019</a:t>
+              <a:t>07/10/2019</a:t>
             </a:fld>
             <a:endParaRPr lang="pt-BR"/>
           </a:p>
@@ -2314,7 +2315,7 @@
           <a:p>
             <a:fld id="{E04F2195-75BF-44EC-BF37-2B2A1FBED77A}" type="slidenum">
               <a:rPr lang="pt-BR" smtClean="0"/>
-              <a:t>‹nº›</a:t>
+              <a:t>‹Nº›</a:t>
             </a:fld>
             <a:endParaRPr lang="pt-BR"/>
           </a:p>
@@ -2525,7 +2526,7 @@
           <a:p>
             <a:fld id="{A024B3BE-3465-4E30-B4C9-D82950137A0E}" type="datetimeFigureOut">
               <a:rPr lang="pt-BR" smtClean="0"/>
-              <a:t>06/02/2019</a:t>
+              <a:t>07/10/2019</a:t>
             </a:fld>
             <a:endParaRPr lang="pt-BR"/>
           </a:p>
@@ -2567,7 +2568,7 @@
           <a:p>
             <a:fld id="{E04F2195-75BF-44EC-BF37-2B2A1FBED77A}" type="slidenum">
               <a:rPr lang="pt-BR" smtClean="0"/>
-              <a:t>‹nº›</a:t>
+              <a:t>‹Nº›</a:t>
             </a:fld>
             <a:endParaRPr lang="pt-BR"/>
           </a:p>
@@ -2738,7 +2739,7 @@
           <a:p>
             <a:fld id="{A024B3BE-3465-4E30-B4C9-D82950137A0E}" type="datetimeFigureOut">
               <a:rPr lang="pt-BR" smtClean="0"/>
-              <a:t>06/02/2019</a:t>
+              <a:t>07/10/2019</a:t>
             </a:fld>
             <a:endParaRPr lang="pt-BR"/>
           </a:p>
@@ -2816,7 +2817,7 @@
           <a:p>
             <a:fld id="{E04F2195-75BF-44EC-BF37-2B2A1FBED77A}" type="slidenum">
               <a:rPr lang="pt-BR" smtClean="0"/>
-              <a:t>‹nº›</a:t>
+              <a:t>‹Nº›</a:t>
             </a:fld>
             <a:endParaRPr lang="pt-BR"/>
           </a:p>
@@ -3304,6 +3305,71 @@
 </p:sld>
 </file>
 
+<file path=ppt/slides/slide4.xml><?xml version="1.0" encoding="utf-8"?>
+<p:sld xmlns:a="http://schemas.openxmlformats.org/drawingml/2006/main" xmlns:r="http://schemas.openxmlformats.org/officeDocument/2006/relationships" xmlns:p="http://schemas.openxmlformats.org/presentationml/2006/main">
+  <p:cSld>
+    <p:spTree>
+      <p:nvGrpSpPr>
+        <p:cNvPr id="1" name=""/>
+        <p:cNvGrpSpPr/>
+        <p:nvPr/>
+      </p:nvGrpSpPr>
+      <p:grpSpPr>
+        <a:xfrm>
+          <a:off x="0" y="0"/>
+          <a:ext cx="0" cy="0"/>
+          <a:chOff x="0" y="0"/>
+          <a:chExt cx="0" cy="0"/>
+        </a:xfrm>
+      </p:grpSpPr>
+      <p:pic>
+        <p:nvPicPr>
+          <p:cNvPr id="4" name="Imagen 3"/>
+          <p:cNvPicPr>
+            <a:picLocks noChangeAspect="1"/>
+          </p:cNvPicPr>
+          <p:nvPr/>
+        </p:nvPicPr>
+        <p:blipFill rotWithShape="1">
+          <a:blip r:embed="rId2">
+            <a:extLst>
+              <a:ext uri="{28A0092B-C50C-407E-A947-70E740481C1C}">
+                <a14:useLocalDpi xmlns:a14="http://schemas.microsoft.com/office/drawing/2010/main" val="0"/>
+              </a:ext>
+            </a:extLst>
+          </a:blip>
+          <a:srcRect l="-209" t="31499" r="209" b="651"/>
+          <a:stretch/>
+        </p:blipFill>
+        <p:spPr>
+          <a:xfrm>
+            <a:off x="2258094" y="692696"/>
+            <a:ext cx="4627811" cy="4653136"/>
+          </a:xfrm>
+          <a:prstGeom prst="ellipse">
+            <a:avLst/>
+          </a:prstGeom>
+          <a:ln>
+            <a:noFill/>
+          </a:ln>
+          <a:effectLst>
+            <a:softEdge rad="112500"/>
+          </a:effectLst>
+        </p:spPr>
+      </p:pic>
+    </p:spTree>
+    <p:extLst>
+      <p:ext uri="{BB962C8B-B14F-4D97-AF65-F5344CB8AC3E}">
+        <p14:creationId xmlns:p14="http://schemas.microsoft.com/office/powerpoint/2010/main" val="2696373801"/>
+      </p:ext>
+    </p:extLst>
+  </p:cSld>
+  <p:clrMapOvr>
+    <a:masterClrMapping/>
+  </p:clrMapOvr>
+</p:sld>
+</file>
+
 <file path=ppt/theme/theme1.xml><?xml version="1.0" encoding="utf-8"?>
 <a:theme xmlns:a="http://schemas.openxmlformats.org/drawingml/2006/main" name="Tema do Office">
   <a:themeElements>

</xml_diff>

<commit_message>
Se cambió la dimension de la foto de Bea
</commit_message>
<xml_diff>
--- a/imagenes/fotos_conferencistas.pptx
+++ b/imagenes/fotos_conferencistas.pptx
@@ -9,6 +9,7 @@
     <p:sldId id="257" r:id="rId3"/>
     <p:sldId id="258" r:id="rId4"/>
     <p:sldId id="259" r:id="rId5"/>
+    <p:sldId id="260" r:id="rId6"/>
   </p:sldIdLst>
   <p:sldSz cx="9144000" cy="6858000" type="screen4x3"/>
   <p:notesSz cx="6858000" cy="9144000"/>
@@ -164,10 +165,9 @@
           <a:lstStyle/>
           <a:p>
             <a:r>
-              <a:rPr lang="pt-BR" smtClean="0"/>
+              <a:rPr lang="pt-BR"/>
               <a:t>Clique para editar o título mestre</a:t>
             </a:r>
-            <a:endParaRPr lang="pt-BR"/>
           </a:p>
         </p:txBody>
       </p:sp>
@@ -283,10 +283,9 @@
           </a:lstStyle>
           <a:p>
             <a:r>
-              <a:rPr lang="pt-BR" smtClean="0"/>
+              <a:rPr lang="pt-BR"/>
               <a:t>Clique para editar o estilo do subtítulo mestre</a:t>
             </a:r>
-            <a:endParaRPr lang="pt-BR"/>
           </a:p>
         </p:txBody>
       </p:sp>
@@ -307,7 +306,7 @@
           <a:p>
             <a:fld id="{A024B3BE-3465-4E30-B4C9-D82950137A0E}" type="datetimeFigureOut">
               <a:rPr lang="pt-BR" smtClean="0"/>
-              <a:t>07/10/2019</a:t>
+              <a:t>03/05/2023</a:t>
             </a:fld>
             <a:endParaRPr lang="pt-BR"/>
           </a:p>
@@ -401,10 +400,9 @@
           <a:lstStyle/>
           <a:p>
             <a:r>
-              <a:rPr lang="pt-BR" smtClean="0"/>
+              <a:rPr lang="pt-BR"/>
               <a:t>Clique para editar o título mestre</a:t>
             </a:r>
-            <a:endParaRPr lang="pt-BR"/>
           </a:p>
         </p:txBody>
       </p:sp>
@@ -425,38 +423,37 @@
           <a:p>
             <a:pPr lvl="0"/>
             <a:r>
-              <a:rPr lang="pt-BR" smtClean="0"/>
+              <a:rPr lang="pt-BR"/>
               <a:t>Clique para editar o texto mestre</a:t>
             </a:r>
           </a:p>
           <a:p>
             <a:pPr lvl="1"/>
             <a:r>
-              <a:rPr lang="pt-BR" smtClean="0"/>
+              <a:rPr lang="pt-BR"/>
               <a:t>Segundo nível</a:t>
             </a:r>
           </a:p>
           <a:p>
             <a:pPr lvl="2"/>
             <a:r>
-              <a:rPr lang="pt-BR" smtClean="0"/>
+              <a:rPr lang="pt-BR"/>
               <a:t>Terceiro nível</a:t>
             </a:r>
           </a:p>
           <a:p>
             <a:pPr lvl="3"/>
             <a:r>
-              <a:rPr lang="pt-BR" smtClean="0"/>
+              <a:rPr lang="pt-BR"/>
               <a:t>Quarto nível</a:t>
             </a:r>
           </a:p>
           <a:p>
             <a:pPr lvl="4"/>
             <a:r>
-              <a:rPr lang="pt-BR" smtClean="0"/>
+              <a:rPr lang="pt-BR"/>
               <a:t>Quinto nível</a:t>
             </a:r>
-            <a:endParaRPr lang="pt-BR"/>
           </a:p>
         </p:txBody>
       </p:sp>
@@ -477,7 +474,7 @@
           <a:p>
             <a:fld id="{A024B3BE-3465-4E30-B4C9-D82950137A0E}" type="datetimeFigureOut">
               <a:rPr lang="pt-BR" smtClean="0"/>
-              <a:t>07/10/2019</a:t>
+              <a:t>03/05/2023</a:t>
             </a:fld>
             <a:endParaRPr lang="pt-BR"/>
           </a:p>
@@ -576,10 +573,9 @@
           <a:lstStyle/>
           <a:p>
             <a:r>
-              <a:rPr lang="pt-BR" smtClean="0"/>
+              <a:rPr lang="pt-BR"/>
               <a:t>Clique para editar o título mestre</a:t>
             </a:r>
-            <a:endParaRPr lang="pt-BR"/>
           </a:p>
         </p:txBody>
       </p:sp>
@@ -605,38 +601,37 @@
           <a:p>
             <a:pPr lvl="0"/>
             <a:r>
-              <a:rPr lang="pt-BR" smtClean="0"/>
+              <a:rPr lang="pt-BR"/>
               <a:t>Clique para editar o texto mestre</a:t>
             </a:r>
           </a:p>
           <a:p>
             <a:pPr lvl="1"/>
             <a:r>
-              <a:rPr lang="pt-BR" smtClean="0"/>
+              <a:rPr lang="pt-BR"/>
               <a:t>Segundo nível</a:t>
             </a:r>
           </a:p>
           <a:p>
             <a:pPr lvl="2"/>
             <a:r>
-              <a:rPr lang="pt-BR" smtClean="0"/>
+              <a:rPr lang="pt-BR"/>
               <a:t>Terceiro nível</a:t>
             </a:r>
           </a:p>
           <a:p>
             <a:pPr lvl="3"/>
             <a:r>
-              <a:rPr lang="pt-BR" smtClean="0"/>
+              <a:rPr lang="pt-BR"/>
               <a:t>Quarto nível</a:t>
             </a:r>
           </a:p>
           <a:p>
             <a:pPr lvl="4"/>
             <a:r>
-              <a:rPr lang="pt-BR" smtClean="0"/>
+              <a:rPr lang="pt-BR"/>
               <a:t>Quinto nível</a:t>
             </a:r>
-            <a:endParaRPr lang="pt-BR"/>
           </a:p>
         </p:txBody>
       </p:sp>
@@ -657,7 +652,7 @@
           <a:p>
             <a:fld id="{A024B3BE-3465-4E30-B4C9-D82950137A0E}" type="datetimeFigureOut">
               <a:rPr lang="pt-BR" smtClean="0"/>
-              <a:t>07/10/2019</a:t>
+              <a:t>03/05/2023</a:t>
             </a:fld>
             <a:endParaRPr lang="pt-BR"/>
           </a:p>
@@ -751,10 +746,9 @@
           <a:lstStyle/>
           <a:p>
             <a:r>
-              <a:rPr lang="pt-BR" smtClean="0"/>
+              <a:rPr lang="pt-BR"/>
               <a:t>Clique para editar o título mestre</a:t>
             </a:r>
-            <a:endParaRPr lang="pt-BR"/>
           </a:p>
         </p:txBody>
       </p:sp>
@@ -775,38 +769,37 @@
           <a:p>
             <a:pPr lvl="0"/>
             <a:r>
-              <a:rPr lang="pt-BR" smtClean="0"/>
+              <a:rPr lang="pt-BR"/>
               <a:t>Clique para editar o texto mestre</a:t>
             </a:r>
           </a:p>
           <a:p>
             <a:pPr lvl="1"/>
             <a:r>
-              <a:rPr lang="pt-BR" smtClean="0"/>
+              <a:rPr lang="pt-BR"/>
               <a:t>Segundo nível</a:t>
             </a:r>
           </a:p>
           <a:p>
             <a:pPr lvl="2"/>
             <a:r>
-              <a:rPr lang="pt-BR" smtClean="0"/>
+              <a:rPr lang="pt-BR"/>
               <a:t>Terceiro nível</a:t>
             </a:r>
           </a:p>
           <a:p>
             <a:pPr lvl="3"/>
             <a:r>
-              <a:rPr lang="pt-BR" smtClean="0"/>
+              <a:rPr lang="pt-BR"/>
               <a:t>Quarto nível</a:t>
             </a:r>
           </a:p>
           <a:p>
             <a:pPr lvl="4"/>
             <a:r>
-              <a:rPr lang="pt-BR" smtClean="0"/>
+              <a:rPr lang="pt-BR"/>
               <a:t>Quinto nível</a:t>
             </a:r>
-            <a:endParaRPr lang="pt-BR"/>
           </a:p>
         </p:txBody>
       </p:sp>
@@ -827,7 +820,7 @@
           <a:p>
             <a:fld id="{A024B3BE-3465-4E30-B4C9-D82950137A0E}" type="datetimeFigureOut">
               <a:rPr lang="pt-BR" smtClean="0"/>
-              <a:t>07/10/2019</a:t>
+              <a:t>03/05/2023</a:t>
             </a:fld>
             <a:endParaRPr lang="pt-BR"/>
           </a:p>
@@ -930,10 +923,9 @@
           </a:lstStyle>
           <a:p>
             <a:r>
-              <a:rPr lang="pt-BR" smtClean="0"/>
+              <a:rPr lang="pt-BR"/>
               <a:t>Clique para editar o título mestre</a:t>
             </a:r>
-            <a:endParaRPr lang="pt-BR"/>
           </a:p>
         </p:txBody>
       </p:sp>
@@ -1050,7 +1042,7 @@
           <a:p>
             <a:pPr lvl="0"/>
             <a:r>
-              <a:rPr lang="pt-BR" smtClean="0"/>
+              <a:rPr lang="pt-BR"/>
               <a:t>Clique para editar o texto mestre</a:t>
             </a:r>
           </a:p>
@@ -1073,7 +1065,7 @@
           <a:p>
             <a:fld id="{A024B3BE-3465-4E30-B4C9-D82950137A0E}" type="datetimeFigureOut">
               <a:rPr lang="pt-BR" smtClean="0"/>
-              <a:t>07/10/2019</a:t>
+              <a:t>03/05/2023</a:t>
             </a:fld>
             <a:endParaRPr lang="pt-BR"/>
           </a:p>
@@ -1167,10 +1159,9 @@
           <a:lstStyle/>
           <a:p>
             <a:r>
-              <a:rPr lang="pt-BR" smtClean="0"/>
+              <a:rPr lang="pt-BR"/>
               <a:t>Clique para editar o título mestre</a:t>
             </a:r>
-            <a:endParaRPr lang="pt-BR"/>
           </a:p>
         </p:txBody>
       </p:sp>
@@ -1224,38 +1215,37 @@
           <a:p>
             <a:pPr lvl="0"/>
             <a:r>
-              <a:rPr lang="pt-BR" smtClean="0"/>
+              <a:rPr lang="pt-BR"/>
               <a:t>Clique para editar o texto mestre</a:t>
             </a:r>
           </a:p>
           <a:p>
             <a:pPr lvl="1"/>
             <a:r>
-              <a:rPr lang="pt-BR" smtClean="0"/>
+              <a:rPr lang="pt-BR"/>
               <a:t>Segundo nível</a:t>
             </a:r>
           </a:p>
           <a:p>
             <a:pPr lvl="2"/>
             <a:r>
-              <a:rPr lang="pt-BR" smtClean="0"/>
+              <a:rPr lang="pt-BR"/>
               <a:t>Terceiro nível</a:t>
             </a:r>
           </a:p>
           <a:p>
             <a:pPr lvl="3"/>
             <a:r>
-              <a:rPr lang="pt-BR" smtClean="0"/>
+              <a:rPr lang="pt-BR"/>
               <a:t>Quarto nível</a:t>
             </a:r>
           </a:p>
           <a:p>
             <a:pPr lvl="4"/>
             <a:r>
-              <a:rPr lang="pt-BR" smtClean="0"/>
+              <a:rPr lang="pt-BR"/>
               <a:t>Quinto nível</a:t>
             </a:r>
-            <a:endParaRPr lang="pt-BR"/>
           </a:p>
         </p:txBody>
       </p:sp>
@@ -1309,38 +1299,37 @@
           <a:p>
             <a:pPr lvl="0"/>
             <a:r>
-              <a:rPr lang="pt-BR" smtClean="0"/>
+              <a:rPr lang="pt-BR"/>
               <a:t>Clique para editar o texto mestre</a:t>
             </a:r>
           </a:p>
           <a:p>
             <a:pPr lvl="1"/>
             <a:r>
-              <a:rPr lang="pt-BR" smtClean="0"/>
+              <a:rPr lang="pt-BR"/>
               <a:t>Segundo nível</a:t>
             </a:r>
           </a:p>
           <a:p>
             <a:pPr lvl="2"/>
             <a:r>
-              <a:rPr lang="pt-BR" smtClean="0"/>
+              <a:rPr lang="pt-BR"/>
               <a:t>Terceiro nível</a:t>
             </a:r>
           </a:p>
           <a:p>
             <a:pPr lvl="3"/>
             <a:r>
-              <a:rPr lang="pt-BR" smtClean="0"/>
+              <a:rPr lang="pt-BR"/>
               <a:t>Quarto nível</a:t>
             </a:r>
           </a:p>
           <a:p>
             <a:pPr lvl="4"/>
             <a:r>
-              <a:rPr lang="pt-BR" smtClean="0"/>
+              <a:rPr lang="pt-BR"/>
               <a:t>Quinto nível</a:t>
             </a:r>
-            <a:endParaRPr lang="pt-BR"/>
           </a:p>
         </p:txBody>
       </p:sp>
@@ -1361,7 +1350,7 @@
           <a:p>
             <a:fld id="{A024B3BE-3465-4E30-B4C9-D82950137A0E}" type="datetimeFigureOut">
               <a:rPr lang="pt-BR" smtClean="0"/>
-              <a:t>07/10/2019</a:t>
+              <a:t>03/05/2023</a:t>
             </a:fld>
             <a:endParaRPr lang="pt-BR"/>
           </a:p>
@@ -1459,10 +1448,9 @@
           </a:lstStyle>
           <a:p>
             <a:r>
-              <a:rPr lang="pt-BR" smtClean="0"/>
+              <a:rPr lang="pt-BR"/>
               <a:t>Clique para editar o título mestre</a:t>
             </a:r>
-            <a:endParaRPr lang="pt-BR"/>
           </a:p>
         </p:txBody>
       </p:sp>
@@ -1525,7 +1513,7 @@
           <a:p>
             <a:pPr lvl="0"/>
             <a:r>
-              <a:rPr lang="pt-BR" smtClean="0"/>
+              <a:rPr lang="pt-BR"/>
               <a:t>Clique para editar o texto mestre</a:t>
             </a:r>
           </a:p>
@@ -1581,38 +1569,37 @@
           <a:p>
             <a:pPr lvl="0"/>
             <a:r>
-              <a:rPr lang="pt-BR" smtClean="0"/>
+              <a:rPr lang="pt-BR"/>
               <a:t>Clique para editar o texto mestre</a:t>
             </a:r>
           </a:p>
           <a:p>
             <a:pPr lvl="1"/>
             <a:r>
-              <a:rPr lang="pt-BR" smtClean="0"/>
+              <a:rPr lang="pt-BR"/>
               <a:t>Segundo nível</a:t>
             </a:r>
           </a:p>
           <a:p>
             <a:pPr lvl="2"/>
             <a:r>
-              <a:rPr lang="pt-BR" smtClean="0"/>
+              <a:rPr lang="pt-BR"/>
               <a:t>Terceiro nível</a:t>
             </a:r>
           </a:p>
           <a:p>
             <a:pPr lvl="3"/>
             <a:r>
-              <a:rPr lang="pt-BR" smtClean="0"/>
+              <a:rPr lang="pt-BR"/>
               <a:t>Quarto nível</a:t>
             </a:r>
           </a:p>
           <a:p>
             <a:pPr lvl="4"/>
             <a:r>
-              <a:rPr lang="pt-BR" smtClean="0"/>
+              <a:rPr lang="pt-BR"/>
               <a:t>Quinto nível</a:t>
             </a:r>
-            <a:endParaRPr lang="pt-BR"/>
           </a:p>
         </p:txBody>
       </p:sp>
@@ -1675,7 +1662,7 @@
           <a:p>
             <a:pPr lvl="0"/>
             <a:r>
-              <a:rPr lang="pt-BR" smtClean="0"/>
+              <a:rPr lang="pt-BR"/>
               <a:t>Clique para editar o texto mestre</a:t>
             </a:r>
           </a:p>
@@ -1731,38 +1718,37 @@
           <a:p>
             <a:pPr lvl="0"/>
             <a:r>
-              <a:rPr lang="pt-BR" smtClean="0"/>
+              <a:rPr lang="pt-BR"/>
               <a:t>Clique para editar o texto mestre</a:t>
             </a:r>
           </a:p>
           <a:p>
             <a:pPr lvl="1"/>
             <a:r>
-              <a:rPr lang="pt-BR" smtClean="0"/>
+              <a:rPr lang="pt-BR"/>
               <a:t>Segundo nível</a:t>
             </a:r>
           </a:p>
           <a:p>
             <a:pPr lvl="2"/>
             <a:r>
-              <a:rPr lang="pt-BR" smtClean="0"/>
+              <a:rPr lang="pt-BR"/>
               <a:t>Terceiro nível</a:t>
             </a:r>
           </a:p>
           <a:p>
             <a:pPr lvl="3"/>
             <a:r>
-              <a:rPr lang="pt-BR" smtClean="0"/>
+              <a:rPr lang="pt-BR"/>
               <a:t>Quarto nível</a:t>
             </a:r>
           </a:p>
           <a:p>
             <a:pPr lvl="4"/>
             <a:r>
-              <a:rPr lang="pt-BR" smtClean="0"/>
+              <a:rPr lang="pt-BR"/>
               <a:t>Quinto nível</a:t>
             </a:r>
-            <a:endParaRPr lang="pt-BR"/>
           </a:p>
         </p:txBody>
       </p:sp>
@@ -1783,7 +1769,7 @@
           <a:p>
             <a:fld id="{A024B3BE-3465-4E30-B4C9-D82950137A0E}" type="datetimeFigureOut">
               <a:rPr lang="pt-BR" smtClean="0"/>
-              <a:t>07/10/2019</a:t>
+              <a:t>03/05/2023</a:t>
             </a:fld>
             <a:endParaRPr lang="pt-BR"/>
           </a:p>
@@ -1877,10 +1863,9 @@
           <a:lstStyle/>
           <a:p>
             <a:r>
-              <a:rPr lang="pt-BR" smtClean="0"/>
+              <a:rPr lang="pt-BR"/>
               <a:t>Clique para editar o título mestre</a:t>
             </a:r>
-            <a:endParaRPr lang="pt-BR"/>
           </a:p>
         </p:txBody>
       </p:sp>
@@ -1901,7 +1886,7 @@
           <a:p>
             <a:fld id="{A024B3BE-3465-4E30-B4C9-D82950137A0E}" type="datetimeFigureOut">
               <a:rPr lang="pt-BR" smtClean="0"/>
-              <a:t>07/10/2019</a:t>
+              <a:t>03/05/2023</a:t>
             </a:fld>
             <a:endParaRPr lang="pt-BR"/>
           </a:p>
@@ -1996,7 +1981,7 @@
           <a:p>
             <a:fld id="{A024B3BE-3465-4E30-B4C9-D82950137A0E}" type="datetimeFigureOut">
               <a:rPr lang="pt-BR" smtClean="0"/>
-              <a:t>07/10/2019</a:t>
+              <a:t>03/05/2023</a:t>
             </a:fld>
             <a:endParaRPr lang="pt-BR"/>
           </a:p>
@@ -2099,10 +2084,9 @@
           </a:lstStyle>
           <a:p>
             <a:r>
-              <a:rPr lang="pt-BR" smtClean="0"/>
+              <a:rPr lang="pt-BR"/>
               <a:t>Clique para editar o título mestre</a:t>
             </a:r>
-            <a:endParaRPr lang="pt-BR"/>
           </a:p>
         </p:txBody>
       </p:sp>
@@ -2156,38 +2140,37 @@
           <a:p>
             <a:pPr lvl="0"/>
             <a:r>
-              <a:rPr lang="pt-BR" smtClean="0"/>
+              <a:rPr lang="pt-BR"/>
               <a:t>Clique para editar o texto mestre</a:t>
             </a:r>
           </a:p>
           <a:p>
             <a:pPr lvl="1"/>
             <a:r>
-              <a:rPr lang="pt-BR" smtClean="0"/>
+              <a:rPr lang="pt-BR"/>
               <a:t>Segundo nível</a:t>
             </a:r>
           </a:p>
           <a:p>
             <a:pPr lvl="2"/>
             <a:r>
-              <a:rPr lang="pt-BR" smtClean="0"/>
+              <a:rPr lang="pt-BR"/>
               <a:t>Terceiro nível</a:t>
             </a:r>
           </a:p>
           <a:p>
             <a:pPr lvl="3"/>
             <a:r>
-              <a:rPr lang="pt-BR" smtClean="0"/>
+              <a:rPr lang="pt-BR"/>
               <a:t>Quarto nível</a:t>
             </a:r>
           </a:p>
           <a:p>
             <a:pPr lvl="4"/>
             <a:r>
-              <a:rPr lang="pt-BR" smtClean="0"/>
+              <a:rPr lang="pt-BR"/>
               <a:t>Quinto nível</a:t>
             </a:r>
-            <a:endParaRPr lang="pt-BR"/>
           </a:p>
         </p:txBody>
       </p:sp>
@@ -2250,7 +2233,7 @@
           <a:p>
             <a:pPr lvl="0"/>
             <a:r>
-              <a:rPr lang="pt-BR" smtClean="0"/>
+              <a:rPr lang="pt-BR"/>
               <a:t>Clique para editar o texto mestre</a:t>
             </a:r>
           </a:p>
@@ -2273,7 +2256,7 @@
           <a:p>
             <a:fld id="{A024B3BE-3465-4E30-B4C9-D82950137A0E}" type="datetimeFigureOut">
               <a:rPr lang="pt-BR" smtClean="0"/>
-              <a:t>07/10/2019</a:t>
+              <a:t>03/05/2023</a:t>
             </a:fld>
             <a:endParaRPr lang="pt-BR"/>
           </a:p>
@@ -2376,10 +2359,9 @@
           </a:lstStyle>
           <a:p>
             <a:r>
-              <a:rPr lang="pt-BR" smtClean="0"/>
+              <a:rPr lang="pt-BR"/>
               <a:t>Clique para editar o título mestre</a:t>
             </a:r>
-            <a:endParaRPr lang="pt-BR"/>
           </a:p>
         </p:txBody>
       </p:sp>
@@ -2503,7 +2485,7 @@
           <a:p>
             <a:pPr lvl="0"/>
             <a:r>
-              <a:rPr lang="pt-BR" smtClean="0"/>
+              <a:rPr lang="pt-BR"/>
               <a:t>Clique para editar o texto mestre</a:t>
             </a:r>
           </a:p>
@@ -2526,7 +2508,7 @@
           <a:p>
             <a:fld id="{A024B3BE-3465-4E30-B4C9-D82950137A0E}" type="datetimeFigureOut">
               <a:rPr lang="pt-BR" smtClean="0"/>
-              <a:t>07/10/2019</a:t>
+              <a:t>03/05/2023</a:t>
             </a:fld>
             <a:endParaRPr lang="pt-BR"/>
           </a:p>
@@ -2635,10 +2617,9 @@
           <a:lstStyle/>
           <a:p>
             <a:r>
-              <a:rPr lang="pt-BR" smtClean="0"/>
+              <a:rPr lang="pt-BR"/>
               <a:t>Clique para editar o título mestre</a:t>
             </a:r>
-            <a:endParaRPr lang="pt-BR"/>
           </a:p>
         </p:txBody>
       </p:sp>
@@ -2669,38 +2650,37 @@
           <a:p>
             <a:pPr lvl="0"/>
             <a:r>
-              <a:rPr lang="pt-BR" smtClean="0"/>
+              <a:rPr lang="pt-BR"/>
               <a:t>Clique para editar o texto mestre</a:t>
             </a:r>
           </a:p>
           <a:p>
             <a:pPr lvl="1"/>
             <a:r>
-              <a:rPr lang="pt-BR" smtClean="0"/>
+              <a:rPr lang="pt-BR"/>
               <a:t>Segundo nível</a:t>
             </a:r>
           </a:p>
           <a:p>
             <a:pPr lvl="2"/>
             <a:r>
-              <a:rPr lang="pt-BR" smtClean="0"/>
+              <a:rPr lang="pt-BR"/>
               <a:t>Terceiro nível</a:t>
             </a:r>
           </a:p>
           <a:p>
             <a:pPr lvl="3"/>
             <a:r>
-              <a:rPr lang="pt-BR" smtClean="0"/>
+              <a:rPr lang="pt-BR"/>
               <a:t>Quarto nível</a:t>
             </a:r>
           </a:p>
           <a:p>
             <a:pPr lvl="4"/>
             <a:r>
-              <a:rPr lang="pt-BR" smtClean="0"/>
+              <a:rPr lang="pt-BR"/>
               <a:t>Quinto nível</a:t>
             </a:r>
-            <a:endParaRPr lang="pt-BR"/>
           </a:p>
         </p:txBody>
       </p:sp>
@@ -2739,7 +2719,7 @@
           <a:p>
             <a:fld id="{A024B3BE-3465-4E30-B4C9-D82950137A0E}" type="datetimeFigureOut">
               <a:rPr lang="pt-BR" smtClean="0"/>
-              <a:t>07/10/2019</a:t>
+              <a:t>03/05/2023</a:t>
             </a:fld>
             <a:endParaRPr lang="pt-BR"/>
           </a:p>
@@ -3370,6 +3350,78 @@
 </p:sld>
 </file>
 
+<file path=ppt/slides/slide5.xml><?xml version="1.0" encoding="utf-8"?>
+<p:sld xmlns:a="http://schemas.openxmlformats.org/drawingml/2006/main" xmlns:r="http://schemas.openxmlformats.org/officeDocument/2006/relationships" xmlns:p="http://schemas.openxmlformats.org/presentationml/2006/main">
+  <p:cSld>
+    <p:spTree>
+      <p:nvGrpSpPr>
+        <p:cNvPr id="1" name=""/>
+        <p:cNvGrpSpPr/>
+        <p:nvPr/>
+      </p:nvGrpSpPr>
+      <p:grpSpPr>
+        <a:xfrm>
+          <a:off x="0" y="0"/>
+          <a:ext cx="0" cy="0"/>
+          <a:chOff x="0" y="0"/>
+          <a:chExt cx="0" cy="0"/>
+        </a:xfrm>
+      </p:grpSpPr>
+      <p:pic>
+        <p:nvPicPr>
+          <p:cNvPr id="3" name="Imagen 2">
+            <a:extLst>
+              <a:ext uri="{FF2B5EF4-FFF2-40B4-BE49-F238E27FC236}">
+                <a16:creationId xmlns:a16="http://schemas.microsoft.com/office/drawing/2014/main" id="{D6078C0E-BF7E-0F0D-C1C3-6DA354952026}"/>
+              </a:ext>
+            </a:extLst>
+          </p:cNvPr>
+          <p:cNvPicPr>
+            <a:picLocks noChangeAspect="1"/>
+          </p:cNvPicPr>
+          <p:nvPr/>
+        </p:nvPicPr>
+        <p:blipFill>
+          <a:blip r:embed="rId2">
+            <a:extLst>
+              <a:ext uri="{28A0092B-C50C-407E-A947-70E740481C1C}">
+                <a14:useLocalDpi xmlns:a14="http://schemas.microsoft.com/office/drawing/2010/main" val="0"/>
+              </a:ext>
+            </a:extLst>
+          </a:blip>
+          <a:stretch>
+            <a:fillRect/>
+          </a:stretch>
+        </p:blipFill>
+        <p:spPr>
+          <a:xfrm>
+            <a:off x="2411760" y="1268760"/>
+            <a:ext cx="4320480" cy="4320480"/>
+          </a:xfrm>
+          <a:prstGeom prst="ellipse">
+            <a:avLst/>
+          </a:prstGeom>
+          <a:ln>
+            <a:noFill/>
+          </a:ln>
+          <a:effectLst>
+            <a:softEdge rad="112500"/>
+          </a:effectLst>
+        </p:spPr>
+      </p:pic>
+    </p:spTree>
+    <p:extLst>
+      <p:ext uri="{BB962C8B-B14F-4D97-AF65-F5344CB8AC3E}">
+        <p14:creationId xmlns:p14="http://schemas.microsoft.com/office/powerpoint/2010/main" val="2877889195"/>
+      </p:ext>
+    </p:extLst>
+  </p:cSld>
+  <p:clrMapOvr>
+    <a:masterClrMapping/>
+  </p:clrMapOvr>
+</p:sld>
+</file>
+
 <file path=ppt/theme/theme1.xml><?xml version="1.0" encoding="utf-8"?>
 <a:theme xmlns:a="http://schemas.openxmlformats.org/drawingml/2006/main" name="Tema do Office">
   <a:themeElements>

</xml_diff>

<commit_message>
se agregaron los conferencistas
</commit_message>
<xml_diff>
--- a/imagenes/fotos_conferencistas.pptx
+++ b/imagenes/fotos_conferencistas.pptx
@@ -5,11 +5,10 @@
     <p:sldMasterId id="2147483648" r:id="rId1"/>
   </p:sldMasterIdLst>
   <p:sldIdLst>
-    <p:sldId id="256" r:id="rId2"/>
-    <p:sldId id="257" r:id="rId3"/>
-    <p:sldId id="258" r:id="rId4"/>
-    <p:sldId id="259" r:id="rId5"/>
-    <p:sldId id="260" r:id="rId6"/>
+    <p:sldId id="259" r:id="rId2"/>
+    <p:sldId id="260" r:id="rId3"/>
+    <p:sldId id="261" r:id="rId4"/>
+    <p:sldId id="262" r:id="rId5"/>
   </p:sldIdLst>
   <p:sldSz cx="9144000" cy="6858000" type="screen4x3"/>
   <p:notesSz cx="6858000" cy="9144000"/>
@@ -306,7 +305,7 @@
           <a:p>
             <a:fld id="{A024B3BE-3465-4E30-B4C9-D82950137A0E}" type="datetimeFigureOut">
               <a:rPr lang="pt-BR" smtClean="0"/>
-              <a:t>03/05/2023</a:t>
+              <a:t>11/05/2023</a:t>
             </a:fld>
             <a:endParaRPr lang="pt-BR"/>
           </a:p>
@@ -348,7 +347,7 @@
           <a:p>
             <a:fld id="{E04F2195-75BF-44EC-BF37-2B2A1FBED77A}" type="slidenum">
               <a:rPr lang="pt-BR" smtClean="0"/>
-              <a:t>‹Nº›</a:t>
+              <a:t>‹#›</a:t>
             </a:fld>
             <a:endParaRPr lang="pt-BR"/>
           </a:p>
@@ -474,7 +473,7 @@
           <a:p>
             <a:fld id="{A024B3BE-3465-4E30-B4C9-D82950137A0E}" type="datetimeFigureOut">
               <a:rPr lang="pt-BR" smtClean="0"/>
-              <a:t>03/05/2023</a:t>
+              <a:t>11/05/2023</a:t>
             </a:fld>
             <a:endParaRPr lang="pt-BR"/>
           </a:p>
@@ -516,7 +515,7 @@
           <a:p>
             <a:fld id="{E04F2195-75BF-44EC-BF37-2B2A1FBED77A}" type="slidenum">
               <a:rPr lang="pt-BR" smtClean="0"/>
-              <a:t>‹Nº›</a:t>
+              <a:t>‹#›</a:t>
             </a:fld>
             <a:endParaRPr lang="pt-BR"/>
           </a:p>
@@ -652,7 +651,7 @@
           <a:p>
             <a:fld id="{A024B3BE-3465-4E30-B4C9-D82950137A0E}" type="datetimeFigureOut">
               <a:rPr lang="pt-BR" smtClean="0"/>
-              <a:t>03/05/2023</a:t>
+              <a:t>11/05/2023</a:t>
             </a:fld>
             <a:endParaRPr lang="pt-BR"/>
           </a:p>
@@ -694,7 +693,7 @@
           <a:p>
             <a:fld id="{E04F2195-75BF-44EC-BF37-2B2A1FBED77A}" type="slidenum">
               <a:rPr lang="pt-BR" smtClean="0"/>
-              <a:t>‹Nº›</a:t>
+              <a:t>‹#›</a:t>
             </a:fld>
             <a:endParaRPr lang="pt-BR"/>
           </a:p>
@@ -820,7 +819,7 @@
           <a:p>
             <a:fld id="{A024B3BE-3465-4E30-B4C9-D82950137A0E}" type="datetimeFigureOut">
               <a:rPr lang="pt-BR" smtClean="0"/>
-              <a:t>03/05/2023</a:t>
+              <a:t>11/05/2023</a:t>
             </a:fld>
             <a:endParaRPr lang="pt-BR"/>
           </a:p>
@@ -862,7 +861,7 @@
           <a:p>
             <a:fld id="{E04F2195-75BF-44EC-BF37-2B2A1FBED77A}" type="slidenum">
               <a:rPr lang="pt-BR" smtClean="0"/>
-              <a:t>‹Nº›</a:t>
+              <a:t>‹#›</a:t>
             </a:fld>
             <a:endParaRPr lang="pt-BR"/>
           </a:p>
@@ -1065,7 +1064,7 @@
           <a:p>
             <a:fld id="{A024B3BE-3465-4E30-B4C9-D82950137A0E}" type="datetimeFigureOut">
               <a:rPr lang="pt-BR" smtClean="0"/>
-              <a:t>03/05/2023</a:t>
+              <a:t>11/05/2023</a:t>
             </a:fld>
             <a:endParaRPr lang="pt-BR"/>
           </a:p>
@@ -1107,7 +1106,7 @@
           <a:p>
             <a:fld id="{E04F2195-75BF-44EC-BF37-2B2A1FBED77A}" type="slidenum">
               <a:rPr lang="pt-BR" smtClean="0"/>
-              <a:t>‹Nº›</a:t>
+              <a:t>‹#›</a:t>
             </a:fld>
             <a:endParaRPr lang="pt-BR"/>
           </a:p>
@@ -1350,7 +1349,7 @@
           <a:p>
             <a:fld id="{A024B3BE-3465-4E30-B4C9-D82950137A0E}" type="datetimeFigureOut">
               <a:rPr lang="pt-BR" smtClean="0"/>
-              <a:t>03/05/2023</a:t>
+              <a:t>11/05/2023</a:t>
             </a:fld>
             <a:endParaRPr lang="pt-BR"/>
           </a:p>
@@ -1392,7 +1391,7 @@
           <a:p>
             <a:fld id="{E04F2195-75BF-44EC-BF37-2B2A1FBED77A}" type="slidenum">
               <a:rPr lang="pt-BR" smtClean="0"/>
-              <a:t>‹Nº›</a:t>
+              <a:t>‹#›</a:t>
             </a:fld>
             <a:endParaRPr lang="pt-BR"/>
           </a:p>
@@ -1769,7 +1768,7 @@
           <a:p>
             <a:fld id="{A024B3BE-3465-4E30-B4C9-D82950137A0E}" type="datetimeFigureOut">
               <a:rPr lang="pt-BR" smtClean="0"/>
-              <a:t>03/05/2023</a:t>
+              <a:t>11/05/2023</a:t>
             </a:fld>
             <a:endParaRPr lang="pt-BR"/>
           </a:p>
@@ -1811,7 +1810,7 @@
           <a:p>
             <a:fld id="{E04F2195-75BF-44EC-BF37-2B2A1FBED77A}" type="slidenum">
               <a:rPr lang="pt-BR" smtClean="0"/>
-              <a:t>‹Nº›</a:t>
+              <a:t>‹#›</a:t>
             </a:fld>
             <a:endParaRPr lang="pt-BR"/>
           </a:p>
@@ -1886,7 +1885,7 @@
           <a:p>
             <a:fld id="{A024B3BE-3465-4E30-B4C9-D82950137A0E}" type="datetimeFigureOut">
               <a:rPr lang="pt-BR" smtClean="0"/>
-              <a:t>03/05/2023</a:t>
+              <a:t>11/05/2023</a:t>
             </a:fld>
             <a:endParaRPr lang="pt-BR"/>
           </a:p>
@@ -1928,7 +1927,7 @@
           <a:p>
             <a:fld id="{E04F2195-75BF-44EC-BF37-2B2A1FBED77A}" type="slidenum">
               <a:rPr lang="pt-BR" smtClean="0"/>
-              <a:t>‹Nº›</a:t>
+              <a:t>‹#›</a:t>
             </a:fld>
             <a:endParaRPr lang="pt-BR"/>
           </a:p>
@@ -1981,7 +1980,7 @@
           <a:p>
             <a:fld id="{A024B3BE-3465-4E30-B4C9-D82950137A0E}" type="datetimeFigureOut">
               <a:rPr lang="pt-BR" smtClean="0"/>
-              <a:t>03/05/2023</a:t>
+              <a:t>11/05/2023</a:t>
             </a:fld>
             <a:endParaRPr lang="pt-BR"/>
           </a:p>
@@ -2023,7 +2022,7 @@
           <a:p>
             <a:fld id="{E04F2195-75BF-44EC-BF37-2B2A1FBED77A}" type="slidenum">
               <a:rPr lang="pt-BR" smtClean="0"/>
-              <a:t>‹Nº›</a:t>
+              <a:t>‹#›</a:t>
             </a:fld>
             <a:endParaRPr lang="pt-BR"/>
           </a:p>
@@ -2256,7 +2255,7 @@
           <a:p>
             <a:fld id="{A024B3BE-3465-4E30-B4C9-D82950137A0E}" type="datetimeFigureOut">
               <a:rPr lang="pt-BR" smtClean="0"/>
-              <a:t>03/05/2023</a:t>
+              <a:t>11/05/2023</a:t>
             </a:fld>
             <a:endParaRPr lang="pt-BR"/>
           </a:p>
@@ -2298,7 +2297,7 @@
           <a:p>
             <a:fld id="{E04F2195-75BF-44EC-BF37-2B2A1FBED77A}" type="slidenum">
               <a:rPr lang="pt-BR" smtClean="0"/>
-              <a:t>‹Nº›</a:t>
+              <a:t>‹#›</a:t>
             </a:fld>
             <a:endParaRPr lang="pt-BR"/>
           </a:p>
@@ -2508,7 +2507,7 @@
           <a:p>
             <a:fld id="{A024B3BE-3465-4E30-B4C9-D82950137A0E}" type="datetimeFigureOut">
               <a:rPr lang="pt-BR" smtClean="0"/>
-              <a:t>03/05/2023</a:t>
+              <a:t>11/05/2023</a:t>
             </a:fld>
             <a:endParaRPr lang="pt-BR"/>
           </a:p>
@@ -2550,7 +2549,7 @@
           <a:p>
             <a:fld id="{E04F2195-75BF-44EC-BF37-2B2A1FBED77A}" type="slidenum">
               <a:rPr lang="pt-BR" smtClean="0"/>
-              <a:t>‹Nº›</a:t>
+              <a:t>‹#›</a:t>
             </a:fld>
             <a:endParaRPr lang="pt-BR"/>
           </a:p>
@@ -2719,7 +2718,7 @@
           <a:p>
             <a:fld id="{A024B3BE-3465-4E30-B4C9-D82950137A0E}" type="datetimeFigureOut">
               <a:rPr lang="pt-BR" smtClean="0"/>
-              <a:t>03/05/2023</a:t>
+              <a:t>11/05/2023</a:t>
             </a:fld>
             <a:endParaRPr lang="pt-BR"/>
           </a:p>
@@ -2797,7 +2796,7 @@
           <a:p>
             <a:fld id="{E04F2195-75BF-44EC-BF37-2B2A1FBED77A}" type="slidenum">
               <a:rPr lang="pt-BR" smtClean="0"/>
-              <a:t>‹Nº›</a:t>
+              <a:t>‹#›</a:t>
             </a:fld>
             <a:endParaRPr lang="pt-BR"/>
           </a:p>
@@ -3096,214 +3095,6 @@
       </p:grpSpPr>
       <p:pic>
         <p:nvPicPr>
-          <p:cNvPr id="4" name="Imagem 3"/>
-          <p:cNvPicPr>
-            <a:picLocks noChangeAspect="1"/>
-          </p:cNvPicPr>
-          <p:nvPr/>
-        </p:nvPicPr>
-        <p:blipFill>
-          <a:blip r:embed="rId2">
-            <a:extLst>
-              <a:ext uri="{28A0092B-C50C-407E-A947-70E740481C1C}">
-                <a14:useLocalDpi xmlns:a14="http://schemas.microsoft.com/office/drawing/2010/main" val="0"/>
-              </a:ext>
-            </a:extLst>
-          </a:blip>
-          <a:stretch>
-            <a:fillRect/>
-          </a:stretch>
-        </p:blipFill>
-        <p:spPr>
-          <a:xfrm>
-            <a:off x="2667000" y="1524000"/>
-            <a:ext cx="3810000" cy="3810000"/>
-          </a:xfrm>
-          <a:prstGeom prst="ellipse">
-            <a:avLst/>
-          </a:prstGeom>
-          <a:ln>
-            <a:noFill/>
-          </a:ln>
-          <a:effectLst>
-            <a:softEdge rad="112500"/>
-          </a:effectLst>
-        </p:spPr>
-      </p:pic>
-    </p:spTree>
-    <p:extLst>
-      <p:ext uri="{BB962C8B-B14F-4D97-AF65-F5344CB8AC3E}">
-        <p14:creationId xmlns:p14="http://schemas.microsoft.com/office/powerpoint/2010/main" val="1213950125"/>
-      </p:ext>
-    </p:extLst>
-  </p:cSld>
-  <p:clrMapOvr>
-    <a:masterClrMapping/>
-  </p:clrMapOvr>
-</p:sld>
-</file>
-
-<file path=ppt/slides/slide2.xml><?xml version="1.0" encoding="utf-8"?>
-<p:sld xmlns:a="http://schemas.openxmlformats.org/drawingml/2006/main" xmlns:r="http://schemas.openxmlformats.org/officeDocument/2006/relationships" xmlns:p="http://schemas.openxmlformats.org/presentationml/2006/main">
-  <p:cSld>
-    <p:spTree>
-      <p:nvGrpSpPr>
-        <p:cNvPr id="1" name=""/>
-        <p:cNvGrpSpPr/>
-        <p:nvPr/>
-      </p:nvGrpSpPr>
-      <p:grpSpPr>
-        <a:xfrm>
-          <a:off x="0" y="0"/>
-          <a:ext cx="0" cy="0"/>
-          <a:chOff x="0" y="0"/>
-          <a:chExt cx="0" cy="0"/>
-        </a:xfrm>
-      </p:grpSpPr>
-      <p:pic>
-        <p:nvPicPr>
-          <p:cNvPr id="1026" name="Picture 2" descr="Mine CetinkayaRundel"/>
-          <p:cNvPicPr>
-            <a:picLocks noChangeAspect="1" noChangeArrowheads="1"/>
-          </p:cNvPicPr>
-          <p:nvPr/>
-        </p:nvPicPr>
-        <p:blipFill>
-          <a:blip r:embed="rId2">
-            <a:extLst>
-              <a:ext uri="{28A0092B-C50C-407E-A947-70E740481C1C}">
-                <a14:useLocalDpi xmlns:a14="http://schemas.microsoft.com/office/drawing/2010/main" val="0"/>
-              </a:ext>
-            </a:extLst>
-          </a:blip>
-          <a:srcRect/>
-          <a:stretch>
-            <a:fillRect/>
-          </a:stretch>
-        </p:blipFill>
-        <p:spPr bwMode="auto">
-          <a:xfrm>
-            <a:off x="2555776" y="1412776"/>
-            <a:ext cx="3810000" cy="3810000"/>
-          </a:xfrm>
-          <a:prstGeom prst="ellipse">
-            <a:avLst/>
-          </a:prstGeom>
-          <a:ln>
-            <a:noFill/>
-          </a:ln>
-          <a:effectLst>
-            <a:softEdge rad="112500"/>
-          </a:effectLst>
-          <a:extLst>
-            <a:ext uri="{909E8E84-426E-40DD-AFC4-6F175D3DCCD1}">
-              <a14:hiddenFill xmlns:a14="http://schemas.microsoft.com/office/drawing/2010/main">
-                <a:solidFill>
-                  <a:srgbClr val="FFFFFF"/>
-                </a:solidFill>
-              </a14:hiddenFill>
-            </a:ext>
-          </a:extLst>
-        </p:spPr>
-      </p:pic>
-    </p:spTree>
-    <p:extLst>
-      <p:ext uri="{BB962C8B-B14F-4D97-AF65-F5344CB8AC3E}">
-        <p14:creationId xmlns:p14="http://schemas.microsoft.com/office/powerpoint/2010/main" val="190919818"/>
-      </p:ext>
-    </p:extLst>
-  </p:cSld>
-  <p:clrMapOvr>
-    <a:masterClrMapping/>
-  </p:clrMapOvr>
-</p:sld>
-</file>
-
-<file path=ppt/slides/slide3.xml><?xml version="1.0" encoding="utf-8"?>
-<p:sld xmlns:a="http://schemas.openxmlformats.org/drawingml/2006/main" xmlns:r="http://schemas.openxmlformats.org/officeDocument/2006/relationships" xmlns:p="http://schemas.openxmlformats.org/presentationml/2006/main">
-  <p:cSld>
-    <p:spTree>
-      <p:nvGrpSpPr>
-        <p:cNvPr id="1" name=""/>
-        <p:cNvGrpSpPr/>
-        <p:nvPr/>
-      </p:nvGrpSpPr>
-      <p:grpSpPr>
-        <a:xfrm>
-          <a:off x="0" y="0"/>
-          <a:ext cx="0" cy="0"/>
-          <a:chOff x="0" y="0"/>
-          <a:chExt cx="0" cy="0"/>
-        </a:xfrm>
-      </p:grpSpPr>
-      <p:pic>
-        <p:nvPicPr>
-          <p:cNvPr id="2" name="Imagem 1"/>
-          <p:cNvPicPr>
-            <a:picLocks noChangeAspect="1"/>
-          </p:cNvPicPr>
-          <p:nvPr/>
-        </p:nvPicPr>
-        <p:blipFill>
-          <a:blip r:embed="rId2">
-            <a:extLst>
-              <a:ext uri="{28A0092B-C50C-407E-A947-70E740481C1C}">
-                <a14:useLocalDpi xmlns:a14="http://schemas.microsoft.com/office/drawing/2010/main" val="0"/>
-              </a:ext>
-            </a:extLst>
-          </a:blip>
-          <a:stretch>
-            <a:fillRect/>
-          </a:stretch>
-        </p:blipFill>
-        <p:spPr>
-          <a:xfrm rot="2675730">
-            <a:off x="3054430" y="2054064"/>
-            <a:ext cx="3103347" cy="3103347"/>
-          </a:xfrm>
-          <a:prstGeom prst="ellipse">
-            <a:avLst/>
-          </a:prstGeom>
-          <a:ln>
-            <a:noFill/>
-          </a:ln>
-          <a:effectLst>
-            <a:softEdge rad="112500"/>
-          </a:effectLst>
-        </p:spPr>
-      </p:pic>
-    </p:spTree>
-    <p:extLst>
-      <p:ext uri="{BB962C8B-B14F-4D97-AF65-F5344CB8AC3E}">
-        <p14:creationId xmlns:p14="http://schemas.microsoft.com/office/powerpoint/2010/main" val="3187778562"/>
-      </p:ext>
-    </p:extLst>
-  </p:cSld>
-  <p:clrMapOvr>
-    <a:masterClrMapping/>
-  </p:clrMapOvr>
-</p:sld>
-</file>
-
-<file path=ppt/slides/slide4.xml><?xml version="1.0" encoding="utf-8"?>
-<p:sld xmlns:a="http://schemas.openxmlformats.org/drawingml/2006/main" xmlns:r="http://schemas.openxmlformats.org/officeDocument/2006/relationships" xmlns:p="http://schemas.openxmlformats.org/presentationml/2006/main">
-  <p:cSld>
-    <p:spTree>
-      <p:nvGrpSpPr>
-        <p:cNvPr id="1" name=""/>
-        <p:cNvGrpSpPr/>
-        <p:nvPr/>
-      </p:nvGrpSpPr>
-      <p:grpSpPr>
-        <a:xfrm>
-          <a:off x="0" y="0"/>
-          <a:ext cx="0" cy="0"/>
-          <a:chOff x="0" y="0"/>
-          <a:chExt cx="0" cy="0"/>
-        </a:xfrm>
-      </p:grpSpPr>
-      <p:pic>
-        <p:nvPicPr>
           <p:cNvPr id="4" name="Imagen 3"/>
           <p:cNvPicPr>
             <a:picLocks noChangeAspect="1"/>
@@ -3350,7 +3141,7 @@
 </p:sld>
 </file>
 
-<file path=ppt/slides/slide5.xml><?xml version="1.0" encoding="utf-8"?>
+<file path=ppt/slides/slide2.xml><?xml version="1.0" encoding="utf-8"?>
 <p:sld xmlns:a="http://schemas.openxmlformats.org/drawingml/2006/main" xmlns:r="http://schemas.openxmlformats.org/officeDocument/2006/relationships" xmlns:p="http://schemas.openxmlformats.org/presentationml/2006/main">
   <p:cSld>
     <p:spTree>
@@ -3413,6 +3204,165 @@
     <p:extLst>
       <p:ext uri="{BB962C8B-B14F-4D97-AF65-F5344CB8AC3E}">
         <p14:creationId xmlns:p14="http://schemas.microsoft.com/office/powerpoint/2010/main" val="2877889195"/>
+      </p:ext>
+    </p:extLst>
+  </p:cSld>
+  <p:clrMapOvr>
+    <a:masterClrMapping/>
+  </p:clrMapOvr>
+</p:sld>
+</file>
+
+<file path=ppt/slides/slide3.xml><?xml version="1.0" encoding="utf-8"?>
+<p:sld xmlns:a="http://schemas.openxmlformats.org/drawingml/2006/main" xmlns:r="http://schemas.openxmlformats.org/officeDocument/2006/relationships" xmlns:p="http://schemas.openxmlformats.org/presentationml/2006/main">
+  <p:cSld>
+    <p:spTree>
+      <p:nvGrpSpPr>
+        <p:cNvPr id="1" name=""/>
+        <p:cNvGrpSpPr/>
+        <p:nvPr/>
+      </p:nvGrpSpPr>
+      <p:grpSpPr>
+        <a:xfrm>
+          <a:off x="0" y="0"/>
+          <a:ext cx="0" cy="0"/>
+          <a:chOff x="0" y="0"/>
+          <a:chExt cx="0" cy="0"/>
+        </a:xfrm>
+      </p:grpSpPr>
+      <p:pic>
+        <p:nvPicPr>
+          <p:cNvPr id="4" name="Picture 2">
+            <a:extLst>
+              <a:ext uri="{FF2B5EF4-FFF2-40B4-BE49-F238E27FC236}">
+                <a16:creationId xmlns:a16="http://schemas.microsoft.com/office/drawing/2014/main" id="{75411014-AE87-E654-6A0D-BC8D56E5A814}"/>
+              </a:ext>
+            </a:extLst>
+          </p:cNvPr>
+          <p:cNvPicPr>
+            <a:picLocks noChangeAspect="1" noChangeArrowheads="1"/>
+          </p:cNvPicPr>
+          <p:nvPr/>
+        </p:nvPicPr>
+        <p:blipFill>
+          <a:blip r:embed="rId2">
+            <a:extLst>
+              <a:ext uri="{28A0092B-C50C-407E-A947-70E740481C1C}">
+                <a14:useLocalDpi xmlns:a14="http://schemas.microsoft.com/office/drawing/2010/main" val="0"/>
+              </a:ext>
+            </a:extLst>
+          </a:blip>
+          <a:srcRect/>
+          <a:stretch>
+            <a:fillRect/>
+          </a:stretch>
+        </p:blipFill>
+        <p:spPr bwMode="auto">
+          <a:xfrm>
+            <a:off x="2438157" y="1334767"/>
+            <a:ext cx="4166067" cy="4188465"/>
+          </a:xfrm>
+          <a:prstGeom prst="ellipse">
+            <a:avLst/>
+          </a:prstGeom>
+          <a:ln>
+            <a:noFill/>
+          </a:ln>
+          <a:effectLst>
+            <a:softEdge rad="112500"/>
+          </a:effectLst>
+          <a:extLst>
+            <a:ext uri="{909E8E84-426E-40DD-AFC4-6F175D3DCCD1}">
+              <a14:hiddenFill xmlns:a14="http://schemas.microsoft.com/office/drawing/2010/main">
+                <a:solidFill>
+                  <a:srgbClr val="FFFFFF"/>
+                </a:solidFill>
+              </a14:hiddenFill>
+            </a:ext>
+          </a:extLst>
+        </p:spPr>
+      </p:pic>
+    </p:spTree>
+    <p:extLst>
+      <p:ext uri="{BB962C8B-B14F-4D97-AF65-F5344CB8AC3E}">
+        <p14:creationId xmlns:p14="http://schemas.microsoft.com/office/powerpoint/2010/main" val="4003224002"/>
+      </p:ext>
+    </p:extLst>
+  </p:cSld>
+  <p:clrMapOvr>
+    <a:masterClrMapping/>
+  </p:clrMapOvr>
+</p:sld>
+</file>
+
+<file path=ppt/slides/slide4.xml><?xml version="1.0" encoding="utf-8"?>
+<p:sld xmlns:a="http://schemas.openxmlformats.org/drawingml/2006/main" xmlns:r="http://schemas.openxmlformats.org/officeDocument/2006/relationships" xmlns:p="http://schemas.openxmlformats.org/presentationml/2006/main">
+  <p:cSld>
+    <p:spTree>
+      <p:nvGrpSpPr>
+        <p:cNvPr id="1" name=""/>
+        <p:cNvGrpSpPr/>
+        <p:nvPr/>
+      </p:nvGrpSpPr>
+      <p:grpSpPr>
+        <a:xfrm>
+          <a:off x="0" y="0"/>
+          <a:ext cx="0" cy="0"/>
+          <a:chOff x="0" y="0"/>
+          <a:chExt cx="0" cy="0"/>
+        </a:xfrm>
+      </p:grpSpPr>
+      <p:pic>
+        <p:nvPicPr>
+          <p:cNvPr id="2" name="Picture 2">
+            <a:extLst>
+              <a:ext uri="{FF2B5EF4-FFF2-40B4-BE49-F238E27FC236}">
+                <a16:creationId xmlns:a16="http://schemas.microsoft.com/office/drawing/2014/main" id="{1B8818A6-B6AB-722B-78BE-900F99FC6B38}"/>
+              </a:ext>
+            </a:extLst>
+          </p:cNvPr>
+          <p:cNvPicPr>
+            <a:picLocks noChangeAspect="1" noChangeArrowheads="1"/>
+          </p:cNvPicPr>
+          <p:nvPr/>
+        </p:nvPicPr>
+        <p:blipFill>
+          <a:blip r:embed="rId2" cstate="print">
+            <a:extLst>
+              <a:ext uri="{28A0092B-C50C-407E-A947-70E740481C1C}">
+                <a14:useLocalDpi xmlns:a14="http://schemas.microsoft.com/office/drawing/2010/main" val="0"/>
+              </a:ext>
+            </a:extLst>
+          </a:blip>
+          <a:srcRect/>
+          <a:stretch>
+            <a:fillRect/>
+          </a:stretch>
+        </p:blipFill>
+        <p:spPr bwMode="auto">
+          <a:xfrm>
+            <a:off x="2544620" y="1401620"/>
+            <a:ext cx="4054760" cy="4054760"/>
+          </a:xfrm>
+          <a:prstGeom prst="rect">
+            <a:avLst/>
+          </a:prstGeom>
+          <a:noFill/>
+          <a:extLst>
+            <a:ext uri="{909E8E84-426E-40DD-AFC4-6F175D3DCCD1}">
+              <a14:hiddenFill xmlns:a14="http://schemas.microsoft.com/office/drawing/2010/main">
+                <a:solidFill>
+                  <a:srgbClr val="FFFFFF"/>
+                </a:solidFill>
+              </a14:hiddenFill>
+            </a:ext>
+          </a:extLst>
+        </p:spPr>
+      </p:pic>
+    </p:spTree>
+    <p:extLst>
+      <p:ext uri="{BB962C8B-B14F-4D97-AF65-F5344CB8AC3E}">
+        <p14:creationId xmlns:p14="http://schemas.microsoft.com/office/powerpoint/2010/main" val="1654693660"/>
       </p:ext>
     </p:extLst>
   </p:cSld>

</xml_diff>